<commit_message>
Update （5G+AI）飞虹微电子.pptx Signed-off-by: wanglvhh <wanglvhh@outlook.com>
</commit_message>
<xml_diff>
--- a/2021/06/科东(广州)软件科技有限公司-广州飞虹微电子有限公司 焊线装片工序不良检测/（5G+AI）飞虹微电子.pptx
+++ b/2021/06/科东(广州)软件科技有限公司-广州飞虹微电子有限公司 焊线装片工序不良检测/（5G+AI）飞虹微电子.pptx
@@ -3442,9 +3442,6 @@
             </a:r>
             <a:r>
               <a:rPr lang="en-US" altLang="zh-CN" dirty="0">
-                <a:solidFill>
-                  <a:srgbClr val="C00000"/>
-                </a:solidFill>
                 <a:ea typeface="黑体" panose="02010609060101010101" pitchFamily="49" charset="-122"/>
                 <a:sym typeface="微软雅黑" panose="020B0503020204020204" pitchFamily="34" charset="-122"/>
               </a:rPr>
@@ -3452,28 +3449,15 @@
             </a:r>
             <a:r>
               <a:rPr lang="zh-CN" altLang="en-US" dirty="0">
-                <a:solidFill>
-                  <a:srgbClr val="C00000"/>
-                </a:solidFill>
                 <a:ea typeface="黑体" panose="02010609060101010101" pitchFamily="49" charset="-122"/>
                 <a:sym typeface="微软雅黑" panose="020B0503020204020204" pitchFamily="34" charset="-122"/>
               </a:rPr>
-              <a:t>产品和</a:t>
+              <a:t>产品和光学硬件及机构设计；</a:t>
             </a:r>
-            <a:r>
-              <a:rPr lang="zh-CN" altLang="en-US" dirty="0">
-                <a:ea typeface="黑体" panose="02010609060101010101" pitchFamily="49" charset="-122"/>
-                <a:sym typeface="微软雅黑" panose="020B0503020204020204" pitchFamily="34" charset="-122"/>
-              </a:rPr>
-              <a:t>光学硬件及机构设计</a:t>
-            </a:r>
-            <a:r>
-              <a:rPr lang="en-US" altLang="zh-CN" dirty="0">
-                <a:ea typeface="黑体" panose="02010609060101010101" pitchFamily="49" charset="-122"/>
-                <a:sym typeface="微软雅黑" panose="020B0503020204020204" pitchFamily="34" charset="-122"/>
-              </a:rPr>
-              <a:t>;</a:t>
-            </a:r>
+            <a:endParaRPr lang="en-US" altLang="zh-CN" dirty="0">
+              <a:ea typeface="黑体" panose="02010609060101010101" pitchFamily="49" charset="-122"/>
+              <a:sym typeface="微软雅黑" panose="020B0503020204020204" pitchFamily="34" charset="-122"/>
+            </a:endParaRPr>
           </a:p>
           <a:p>
             <a:pPr lvl="1"/>
@@ -3496,23 +3480,10 @@
                 <a:ea typeface="黑体" panose="02010609060101010101" pitchFamily="49" charset="-122"/>
                 <a:sym typeface="微软雅黑" panose="020B0503020204020204" pitchFamily="34" charset="-122"/>
               </a:rPr>
-              <a:t>实时传输线体图片数据</a:t>
-            </a:r>
-            <a:r>
-              <a:rPr lang="zh-CN" altLang="en-US" dirty="0">
-                <a:solidFill>
-                  <a:srgbClr val="C00000"/>
-                </a:solidFill>
-                <a:ea typeface="黑体" panose="02010609060101010101" pitchFamily="49" charset="-122"/>
-                <a:sym typeface="微软雅黑" panose="020B0503020204020204" pitchFamily="34" charset="-122"/>
-              </a:rPr>
-              <a:t>每秒达到</a:t>
+              <a:t>实时传输线体图片数据每秒达到</a:t>
             </a:r>
             <a:r>
               <a:rPr lang="en-US" altLang="zh-CN" dirty="0">
-                <a:solidFill>
-                  <a:srgbClr val="C00000"/>
-                </a:solidFill>
                 <a:ea typeface="黑体" panose="02010609060101010101" pitchFamily="49" charset="-122"/>
                 <a:sym typeface="微软雅黑" panose="020B0503020204020204" pitchFamily="34" charset="-122"/>
               </a:rPr>
@@ -3520,9 +3491,6 @@
             </a:r>
             <a:r>
               <a:rPr lang="zh-CN" altLang="en-US" dirty="0">
-                <a:solidFill>
-                  <a:srgbClr val="C00000"/>
-                </a:solidFill>
                 <a:ea typeface="黑体" panose="02010609060101010101" pitchFamily="49" charset="-122"/>
                 <a:sym typeface="微软雅黑" panose="020B0503020204020204" pitchFamily="34" charset="-122"/>
               </a:rPr>
@@ -3530,9 +3498,6 @@
             </a:r>
             <a:r>
               <a:rPr lang="en-US" altLang="zh-CN" dirty="0">
-                <a:solidFill>
-                  <a:srgbClr val="C00000"/>
-                </a:solidFill>
                 <a:ea typeface="黑体" panose="02010609060101010101" pitchFamily="49" charset="-122"/>
                 <a:sym typeface="微软雅黑" panose="020B0503020204020204" pitchFamily="34" charset="-122"/>
               </a:rPr>
@@ -3540,9 +3505,6 @@
             </a:r>
             <a:r>
               <a:rPr lang="zh-CN" altLang="en-US" dirty="0">
-                <a:solidFill>
-                  <a:srgbClr val="C00000"/>
-                </a:solidFill>
                 <a:ea typeface="黑体" panose="02010609060101010101" pitchFamily="49" charset="-122"/>
                 <a:sym typeface="微软雅黑" panose="020B0503020204020204" pitchFamily="34" charset="-122"/>
               </a:rPr>
@@ -3550,9 +3512,6 @@
             </a:r>
             <a:r>
               <a:rPr lang="en-US" altLang="zh-CN" dirty="0">
-                <a:solidFill>
-                  <a:srgbClr val="C00000"/>
-                </a:solidFill>
                 <a:ea typeface="黑体" panose="02010609060101010101" pitchFamily="49" charset="-122"/>
                 <a:sym typeface="微软雅黑" panose="020B0503020204020204" pitchFamily="34" charset="-122"/>
               </a:rPr>
@@ -3560,9 +3519,6 @@
             </a:r>
             <a:r>
               <a:rPr lang="zh-CN" altLang="en-US" dirty="0">
-                <a:solidFill>
-                  <a:srgbClr val="C00000"/>
-                </a:solidFill>
                 <a:ea typeface="黑体" panose="02010609060101010101" pitchFamily="49" charset="-122"/>
                 <a:sym typeface="微软雅黑" panose="020B0503020204020204" pitchFamily="34" charset="-122"/>
               </a:rPr>
@@ -3570,9 +3526,6 @@
             </a:r>
             <a:r>
               <a:rPr lang="en-US" altLang="zh-CN" dirty="0">
-                <a:solidFill>
-                  <a:srgbClr val="C00000"/>
-                </a:solidFill>
                 <a:ea typeface="黑体" panose="02010609060101010101" pitchFamily="49" charset="-122"/>
                 <a:sym typeface="微软雅黑" panose="020B0503020204020204" pitchFamily="34" charset="-122"/>
               </a:rPr>
@@ -3580,18 +3533,12 @@
             </a:r>
             <a:r>
               <a:rPr lang="zh-CN" altLang="en-US" dirty="0">
-                <a:solidFill>
-                  <a:srgbClr val="C00000"/>
-                </a:solidFill>
                 <a:ea typeface="黑体" panose="02010609060101010101" pitchFamily="49" charset="-122"/>
                 <a:sym typeface="微软雅黑" panose="020B0503020204020204" pitchFamily="34" charset="-122"/>
               </a:rPr>
-              <a:t>，用户可以在总部实时查看工厂的信息</a:t>
+              <a:t>，用户可以在总部实时查看工厂的信息；</a:t>
             </a:r>
             <a:endParaRPr lang="en-US" altLang="zh-CN" dirty="0">
-              <a:solidFill>
-                <a:srgbClr val="C00000"/>
-              </a:solidFill>
               <a:ea typeface="黑体" panose="02010609060101010101" pitchFamily="49" charset="-122"/>
               <a:sym typeface="微软雅黑" panose="020B0503020204020204" pitchFamily="34" charset="-122"/>
             </a:endParaRPr>

</xml_diff>